<commit_message>
Added Presentations for the first stage
</commit_message>
<xml_diff>
--- a/presentation/CSAW_2023_first_stage.pptx
+++ b/presentation/CSAW_2023_first_stage.pptx
@@ -19,10 +19,9 @@
     <p:sldId id="267" r:id="rId13"/>
     <p:sldId id="273" r:id="rId14"/>
     <p:sldId id="263" r:id="rId15"/>
-    <p:sldId id="268" r:id="rId16"/>
-    <p:sldId id="270" r:id="rId17"/>
-    <p:sldId id="271" r:id="rId18"/>
-    <p:sldId id="272" r:id="rId19"/>
+    <p:sldId id="275" r:id="rId16"/>
+    <p:sldId id="277" r:id="rId17"/>
+    <p:sldId id="278" r:id="rId18"/>
   </p:sldIdLst>
   <p:sldSz cx="12192000" cy="6858000"/>
   <p:notesSz cx="6858000" cy="9144000"/>
@@ -121,6 +120,11 @@
       </a:defRPr>
     </a:lvl9pPr>
   </p:defaultTextStyle>
+  <p:extLst>
+    <p:ext uri="{EFAFB233-063F-42B5-8137-9DF3F51BA10A}">
+      <p15:sldGuideLst xmlns:p15="http://schemas.microsoft.com/office/powerpoint/2012/main"/>
+    </p:ext>
+  </p:extLst>
 </p:presentation>
 </file>
 
@@ -4426,9 +4430,9 @@
         <p:grpSpPr>
           <a:xfrm>
             <a:off x="1858408" y="580148"/>
-            <a:ext cx="8475184" cy="4644222"/>
+            <a:ext cx="8475184" cy="4590746"/>
             <a:chOff x="2217698" y="594145"/>
-            <a:chExt cx="8475184" cy="4644222"/>
+            <a:chExt cx="8475184" cy="4590746"/>
           </a:xfrm>
         </p:grpSpPr>
         <p:sp>
@@ -4448,7 +4452,7 @@
           <p:spPr>
             <a:xfrm>
               <a:off x="2217698" y="4843096"/>
-              <a:ext cx="8475184" cy="395271"/>
+              <a:ext cx="8475184" cy="341795"/>
             </a:xfrm>
             <a:prstGeom prst="rect">
               <a:avLst/>
@@ -4633,7 +4637,7 @@
                 </a:lnSpc>
               </a:pPr>
               <a:r>
-                <a:rPr lang="en-US" sz="4800" dirty="0">
+                <a:rPr lang="en-US" sz="3200" dirty="0">
                   <a:solidFill>
                     <a:schemeClr val="tx1"/>
                   </a:solidFill>
@@ -4641,30 +4645,28 @@
                   <a:ea typeface="Source Sans Pro" charset="0"/>
                   <a:cs typeface="Source Sans Pro" charset="0"/>
                 </a:rPr>
-                <a:t>A wishbone bus D.O.S. </a:t>
+                <a:t> Leaking key from a </a:t>
               </a:r>
               <a:r>
-                <a:rPr lang="en-US" sz="4800" dirty="0" err="1">
+                <a:rPr lang="en-US" sz="3200" dirty="0">
                   <a:solidFill>
                     <a:schemeClr val="tx1"/>
                   </a:solidFill>
                   <a:latin typeface="Source Sans Pro" charset="0"/>
                   <a:ea typeface="Source Sans Pro" charset="0"/>
                   <a:cs typeface="Source Sans Pro" charset="0"/>
+                  <a:hlinkClick r:id="rId2"/>
                 </a:rPr>
-                <a:t>hw</a:t>
+                <a:t>symmetric AES block cipher</a:t>
               </a:r>
-              <a:r>
-                <a:rPr lang="en-US" sz="4800" dirty="0">
-                  <a:solidFill>
-                    <a:schemeClr val="tx1"/>
-                  </a:solidFill>
-                  <a:latin typeface="Source Sans Pro" charset="0"/>
-                  <a:ea typeface="Source Sans Pro" charset="0"/>
-                  <a:cs typeface="Source Sans Pro" charset="0"/>
-                </a:rPr>
-                <a:t> trojan</a:t>
-              </a:r>
+              <a:endParaRPr lang="en-US" sz="4800" dirty="0">
+                <a:solidFill>
+                  <a:schemeClr val="tx1"/>
+                </a:solidFill>
+                <a:latin typeface="Source Sans Pro" charset="0"/>
+                <a:ea typeface="Source Sans Pro" charset="0"/>
+                <a:cs typeface="Source Sans Pro" charset="0"/>
+              </a:endParaRPr>
             </a:p>
           </p:txBody>
         </p:sp>
@@ -4772,10 +4774,189 @@
           <a:chExt cx="0" cy="0"/>
         </a:xfrm>
       </p:grpSpPr>
+      <p:sp>
+        <p:nvSpPr>
+          <p:cNvPr id="4" name="TextBox 3">
+            <a:extLst>
+              <a:ext uri="{FF2B5EF4-FFF2-40B4-BE49-F238E27FC236}">
+                <a16:creationId xmlns:a16="http://schemas.microsoft.com/office/drawing/2014/main" id="{D2DD5275-256A-0E3B-37C5-D82D8BB5C6D3}"/>
+              </a:ext>
+            </a:extLst>
+          </p:cNvPr>
+          <p:cNvSpPr txBox="1"/>
+          <p:nvPr/>
+        </p:nvSpPr>
+        <p:spPr>
+          <a:xfrm>
+            <a:off x="766763" y="466043"/>
+            <a:ext cx="5831633" cy="461665"/>
+          </a:xfrm>
+          <a:prstGeom prst="rect">
+            <a:avLst/>
+          </a:prstGeom>
+          <a:noFill/>
+        </p:spPr>
+        <p:txBody>
+          <a:bodyPr wrap="square" rtlCol="0">
+            <a:spAutoFit/>
+          </a:bodyPr>
+          <a:lstStyle/>
+          <a:p>
+            <a:r>
+              <a:rPr lang="en-US" sz="2400" dirty="0">
+                <a:latin typeface="Arial Black" panose="020B0A04020102020204" pitchFamily="34" charset="0"/>
+              </a:rPr>
+              <a:t>Why attack AES?</a:t>
+            </a:r>
+            <a:endParaRPr lang="el-GR" sz="2400" dirty="0">
+              <a:latin typeface="Arial Black" panose="020B0A04020102020204" pitchFamily="34" charset="0"/>
+            </a:endParaRPr>
+          </a:p>
+        </p:txBody>
+      </p:sp>
+      <p:sp>
+        <p:nvSpPr>
+          <p:cNvPr id="5" name="TextBox 4">
+            <a:extLst>
+              <a:ext uri="{FF2B5EF4-FFF2-40B4-BE49-F238E27FC236}">
+                <a16:creationId xmlns:a16="http://schemas.microsoft.com/office/drawing/2014/main" id="{A70E2461-D893-2023-C920-E90D61F8B387}"/>
+              </a:ext>
+            </a:extLst>
+          </p:cNvPr>
+          <p:cNvSpPr txBox="1"/>
+          <p:nvPr/>
+        </p:nvSpPr>
+        <p:spPr>
+          <a:xfrm>
+            <a:off x="2359705" y="1789922"/>
+            <a:ext cx="4533900" cy="3693319"/>
+          </a:xfrm>
+          <a:prstGeom prst="rect">
+            <a:avLst/>
+          </a:prstGeom>
+          <a:noFill/>
+        </p:spPr>
+        <p:txBody>
+          <a:bodyPr wrap="square" rtlCol="0">
+            <a:spAutoFit/>
+          </a:bodyPr>
+          <a:lstStyle/>
+          <a:p>
+            <a:r>
+              <a:rPr lang="en-US" dirty="0"/>
+              <a:t>AES is :</a:t>
+            </a:r>
+          </a:p>
+          <a:p>
+            <a:endParaRPr lang="en-US" dirty="0"/>
+          </a:p>
+          <a:p>
+            <a:pPr marL="285750" indent="-285750">
+              <a:buFont typeface="Arial" panose="020B0604020202020204" pitchFamily="34" charset="0"/>
+              <a:buChar char="•"/>
+            </a:pPr>
+            <a:r>
+              <a:rPr lang="en-US" dirty="0"/>
+              <a:t>One of the most popular encryption standards.</a:t>
+            </a:r>
+          </a:p>
+          <a:p>
+            <a:pPr marL="285750" indent="-285750">
+              <a:buFont typeface="Arial" panose="020B0604020202020204" pitchFamily="34" charset="0"/>
+              <a:buChar char="•"/>
+            </a:pPr>
+            <a:r>
+              <a:rPr lang="en-US" dirty="0"/>
+              <a:t>Used broadly all over the world.</a:t>
+            </a:r>
+          </a:p>
+          <a:p>
+            <a:pPr marL="285750" indent="-285750">
+              <a:buFont typeface="Arial" panose="020B0604020202020204" pitchFamily="34" charset="0"/>
+              <a:buChar char="•"/>
+            </a:pPr>
+            <a:r>
+              <a:rPr lang="en-US" dirty="0"/>
+              <a:t>Is globally standardized, regulated and incompliance with governments, individuals and enterprises.</a:t>
+            </a:r>
+          </a:p>
+          <a:p>
+            <a:pPr marL="285750" indent="-285750">
+              <a:buFont typeface="Arial" panose="020B0604020202020204" pitchFamily="34" charset="0"/>
+              <a:buChar char="•"/>
+            </a:pPr>
+            <a:r>
+              <a:rPr lang="en-US" dirty="0"/>
+              <a:t>Is efficient in terms of processing power and memory usage so it is used everywhere.</a:t>
+            </a:r>
+          </a:p>
+          <a:p>
+            <a:pPr marL="285750" indent="-285750">
+              <a:buFont typeface="Arial" panose="020B0604020202020204" pitchFamily="34" charset="0"/>
+              <a:buChar char="•"/>
+            </a:pPr>
+            <a:endParaRPr lang="en-US" dirty="0"/>
+          </a:p>
+          <a:p>
+            <a:pPr marL="285750" indent="-285750">
+              <a:buFont typeface="Arial" panose="020B0604020202020204" pitchFamily="34" charset="0"/>
+              <a:buChar char="•"/>
+            </a:pPr>
+            <a:endParaRPr lang="el-GR" dirty="0"/>
+          </a:p>
+        </p:txBody>
+      </p:sp>
+      <p:pic>
+        <p:nvPicPr>
+          <p:cNvPr id="1026" name="Picture 2" descr="What is Advanced Encryption Standard (AES)? Definition, Encrption,  Decryption, Advantages and Disadvantages - Binary Terms">
+            <a:extLst>
+              <a:ext uri="{FF2B5EF4-FFF2-40B4-BE49-F238E27FC236}">
+                <a16:creationId xmlns:a16="http://schemas.microsoft.com/office/drawing/2014/main" id="{4216DE81-B276-3417-D499-8AE3E6086B5C}"/>
+              </a:ext>
+            </a:extLst>
+          </p:cNvPr>
+          <p:cNvPicPr>
+            <a:picLocks noChangeAspect="1" noChangeArrowheads="1"/>
+          </p:cNvPicPr>
+          <p:nvPr/>
+        </p:nvPicPr>
+        <p:blipFill>
+          <a:blip r:embed="rId2">
+            <a:extLst>
+              <a:ext uri="{28A0092B-C50C-407E-A947-70E740481C1C}">
+                <a14:useLocalDpi xmlns:a14="http://schemas.microsoft.com/office/drawing/2010/main" val="0"/>
+              </a:ext>
+            </a:extLst>
+          </a:blip>
+          <a:srcRect/>
+          <a:stretch>
+            <a:fillRect/>
+          </a:stretch>
+        </p:blipFill>
+        <p:spPr bwMode="auto">
+          <a:xfrm>
+            <a:off x="7188813" y="696875"/>
+            <a:ext cx="2724347" cy="5421086"/>
+          </a:xfrm>
+          <a:prstGeom prst="rect">
+            <a:avLst/>
+          </a:prstGeom>
+          <a:noFill/>
+          <a:extLst>
+            <a:ext uri="{909E8E84-426E-40DD-AFC4-6F175D3DCCD1}">
+              <a14:hiddenFill xmlns:a14="http://schemas.microsoft.com/office/drawing/2010/main">
+                <a:solidFill>
+                  <a:srgbClr val="FFFFFF"/>
+                </a:solidFill>
+              </a14:hiddenFill>
+            </a:ext>
+          </a:extLst>
+        </p:spPr>
+      </p:pic>
     </p:spTree>
     <p:extLst>
       <p:ext uri="{BB962C8B-B14F-4D97-AF65-F5344CB8AC3E}">
-        <p14:creationId xmlns:p14="http://schemas.microsoft.com/office/powerpoint/2010/main" val="736968223"/>
+        <p14:creationId xmlns:p14="http://schemas.microsoft.com/office/powerpoint/2010/main" val="4050734263"/>
       </p:ext>
     </p:extLst>
   </p:cSld>
@@ -4802,10 +4983,164 @@
           <a:chExt cx="0" cy="0"/>
         </a:xfrm>
       </p:grpSpPr>
+      <p:sp>
+        <p:nvSpPr>
+          <p:cNvPr id="9" name="TextBox 8">
+            <a:extLst>
+              <a:ext uri="{FF2B5EF4-FFF2-40B4-BE49-F238E27FC236}">
+                <a16:creationId xmlns:a16="http://schemas.microsoft.com/office/drawing/2014/main" id="{26EDB7A8-B89C-8B2D-95E4-664D4333450A}"/>
+              </a:ext>
+            </a:extLst>
+          </p:cNvPr>
+          <p:cNvSpPr txBox="1"/>
+          <p:nvPr/>
+        </p:nvSpPr>
+        <p:spPr>
+          <a:xfrm>
+            <a:off x="1757265" y="1305341"/>
+            <a:ext cx="5001208" cy="4247317"/>
+          </a:xfrm>
+          <a:prstGeom prst="rect">
+            <a:avLst/>
+          </a:prstGeom>
+          <a:noFill/>
+        </p:spPr>
+        <p:txBody>
+          <a:bodyPr wrap="square" rtlCol="0">
+            <a:spAutoFit/>
+          </a:bodyPr>
+          <a:lstStyle/>
+          <a:p>
+            <a:r>
+              <a:rPr lang="en-US" dirty="0"/>
+              <a:t>An alpha version of our malicious code implementation methodology is:</a:t>
+            </a:r>
+          </a:p>
+          <a:p>
+            <a:endParaRPr lang="en-US" dirty="0"/>
+          </a:p>
+          <a:p>
+            <a:pPr marL="342900" indent="-342900">
+              <a:buFont typeface="+mj-lt"/>
+              <a:buAutoNum type="arabicPeriod"/>
+            </a:pPr>
+            <a:r>
+              <a:rPr lang="en-US" dirty="0"/>
+              <a:t>We first analyzed the code in the </a:t>
+            </a:r>
+            <a:r>
+              <a:rPr lang="en-US" dirty="0">
+                <a:hlinkClick r:id="rId2"/>
+              </a:rPr>
+              <a:t>GitHub repository</a:t>
+            </a:r>
+            <a:r>
+              <a:rPr lang="en-US" dirty="0"/>
+              <a:t>.</a:t>
+            </a:r>
+          </a:p>
+          <a:p>
+            <a:pPr marL="342900" indent="-342900">
+              <a:buFont typeface="+mj-lt"/>
+              <a:buAutoNum type="arabicPeriod"/>
+            </a:pPr>
+            <a:r>
+              <a:rPr lang="en-US" dirty="0"/>
+              <a:t>We use a shift register to store the key.</a:t>
+            </a:r>
+          </a:p>
+          <a:p>
+            <a:pPr marL="342900" indent="-342900">
+              <a:buFont typeface="+mj-lt"/>
+              <a:buAutoNum type="arabicPeriod"/>
+            </a:pPr>
+            <a:r>
+              <a:rPr lang="en-US" dirty="0"/>
+              <a:t>When a pattern is detected through a FSM we use a covert way of leaking the key by,</a:t>
+            </a:r>
+          </a:p>
+          <a:p>
+            <a:pPr marL="342900" indent="-342900">
+              <a:buFont typeface="+mj-lt"/>
+              <a:buAutoNum type="arabicPeriod"/>
+            </a:pPr>
+            <a:r>
+              <a:rPr lang="en-US" dirty="0"/>
+              <a:t>modulating an (unused) pin on chip that generates an RF signal. This signal can be used to transmit the key bits. Then it can be </a:t>
+            </a:r>
+            <a:r>
+              <a:rPr lang="en-US" dirty="0" err="1"/>
+              <a:t>be</a:t>
+            </a:r>
+            <a:r>
+              <a:rPr lang="en-US" dirty="0"/>
+              <a:t> received with an ordinary AM radio. </a:t>
+            </a:r>
+          </a:p>
+          <a:p>
+            <a:pPr marL="342900" indent="-342900">
+              <a:buFont typeface="+mj-lt"/>
+              <a:buAutoNum type="arabicPeriod"/>
+            </a:pPr>
+            <a:r>
+              <a:rPr lang="en-US" dirty="0"/>
+              <a:t>The data carried by the AM signal needs to be easily interpreted by a human by using a beep scheme.</a:t>
+            </a:r>
+            <a:endParaRPr lang="el-GR" dirty="0"/>
+          </a:p>
+        </p:txBody>
+      </p:sp>
+      <p:pic>
+        <p:nvPicPr>
+          <p:cNvPr id="2" name="Picture 2" descr="What is Advanced Encryption Standard (AES)? Definition, Encrption,  Decryption, Advantages and Disadvantages - Binary Terms">
+            <a:extLst>
+              <a:ext uri="{FF2B5EF4-FFF2-40B4-BE49-F238E27FC236}">
+                <a16:creationId xmlns:a16="http://schemas.microsoft.com/office/drawing/2014/main" id="{F337BB01-09AA-3825-7921-78372CB965AC}"/>
+              </a:ext>
+            </a:extLst>
+          </p:cNvPr>
+          <p:cNvPicPr>
+            <a:picLocks noChangeAspect="1" noChangeArrowheads="1"/>
+          </p:cNvPicPr>
+          <p:nvPr/>
+        </p:nvPicPr>
+        <p:blipFill>
+          <a:blip r:embed="rId3">
+            <a:extLst>
+              <a:ext uri="{28A0092B-C50C-407E-A947-70E740481C1C}">
+                <a14:useLocalDpi xmlns:a14="http://schemas.microsoft.com/office/drawing/2010/main" val="0"/>
+              </a:ext>
+            </a:extLst>
+          </a:blip>
+          <a:srcRect/>
+          <a:stretch>
+            <a:fillRect/>
+          </a:stretch>
+        </p:blipFill>
+        <p:spPr bwMode="auto">
+          <a:xfrm>
+            <a:off x="7438149" y="827502"/>
+            <a:ext cx="2724347" cy="5421086"/>
+          </a:xfrm>
+          <a:prstGeom prst="rect">
+            <a:avLst/>
+          </a:prstGeom>
+          <a:noFill/>
+          <a:extLst>
+            <a:ext uri="{909E8E84-426E-40DD-AFC4-6F175D3DCCD1}">
+              <a14:hiddenFill xmlns:a14="http://schemas.microsoft.com/office/drawing/2010/main">
+                <a:solidFill>
+                  <a:srgbClr val="FFFFFF"/>
+                </a:solidFill>
+              </a14:hiddenFill>
+            </a:ext>
+          </a:extLst>
+        </p:spPr>
+      </p:pic>
     </p:spTree>
     <p:extLst>
       <p:ext uri="{BB962C8B-B14F-4D97-AF65-F5344CB8AC3E}">
-        <p14:creationId xmlns:p14="http://schemas.microsoft.com/office/powerpoint/2010/main" val="3916658529"/>
+        <p14:creationId xmlns:p14="http://schemas.microsoft.com/office/powerpoint/2010/main" val="1948821609"/>
       </p:ext>
     </p:extLst>
   </p:cSld>
@@ -4832,40 +5167,224 @@
           <a:chExt cx="0" cy="0"/>
         </a:xfrm>
       </p:grpSpPr>
+      <p:sp>
+        <p:nvSpPr>
+          <p:cNvPr id="2" name="TextBox 1">
+            <a:extLst>
+              <a:ext uri="{FF2B5EF4-FFF2-40B4-BE49-F238E27FC236}">
+                <a16:creationId xmlns:a16="http://schemas.microsoft.com/office/drawing/2014/main" id="{69DFECC6-7A19-B2A9-07C4-56409A6A907B}"/>
+              </a:ext>
+            </a:extLst>
+          </p:cNvPr>
+          <p:cNvSpPr txBox="1"/>
+          <p:nvPr/>
+        </p:nvSpPr>
+        <p:spPr>
+          <a:xfrm>
+            <a:off x="7201677" y="2628028"/>
+            <a:ext cx="3665377" cy="1200329"/>
+          </a:xfrm>
+          <a:prstGeom prst="rect">
+            <a:avLst/>
+          </a:prstGeom>
+          <a:noFill/>
+        </p:spPr>
+        <p:txBody>
+          <a:bodyPr wrap="square" rtlCol="0">
+            <a:spAutoFit/>
+          </a:bodyPr>
+          <a:lstStyle/>
+          <a:p>
+            <a:pPr algn="ctr"/>
+            <a:r>
+              <a:rPr lang="en-US" dirty="0">
+                <a:hlinkClick r:id="rId2"/>
+              </a:rPr>
+              <a:t>Prompt example: https://chat.openai.com/share/dca03999-90f9-4d24-84ba-787d94041459</a:t>
+            </a:r>
+            <a:endParaRPr lang="el-GR" dirty="0"/>
+          </a:p>
+        </p:txBody>
+      </p:sp>
+      <p:sp>
+        <p:nvSpPr>
+          <p:cNvPr id="3" name="TextBox 2">
+            <a:extLst>
+              <a:ext uri="{FF2B5EF4-FFF2-40B4-BE49-F238E27FC236}">
+                <a16:creationId xmlns:a16="http://schemas.microsoft.com/office/drawing/2014/main" id="{7622558D-FAB4-5C35-5F64-F883459FD0DF}"/>
+              </a:ext>
+            </a:extLst>
+          </p:cNvPr>
+          <p:cNvSpPr txBox="1"/>
+          <p:nvPr/>
+        </p:nvSpPr>
+        <p:spPr>
+          <a:xfrm>
+            <a:off x="8022425" y="1713056"/>
+            <a:ext cx="2905276" cy="830997"/>
+          </a:xfrm>
+          <a:prstGeom prst="rect">
+            <a:avLst/>
+          </a:prstGeom>
+          <a:noFill/>
+        </p:spPr>
+        <p:txBody>
+          <a:bodyPr wrap="square" rtlCol="0">
+            <a:spAutoFit/>
+          </a:bodyPr>
+          <a:lstStyle/>
+          <a:p>
+            <a:r>
+              <a:rPr lang="en-US" sz="4800" dirty="0">
+                <a:latin typeface="Arial Black" panose="020B0A04020102020204" pitchFamily="34" charset="0"/>
+              </a:rPr>
+              <a:t>P.O.C.</a:t>
+            </a:r>
+            <a:endParaRPr lang="el-GR" sz="4800" dirty="0">
+              <a:latin typeface="Arial Black" panose="020B0A04020102020204" pitchFamily="34" charset="0"/>
+            </a:endParaRPr>
+          </a:p>
+        </p:txBody>
+      </p:sp>
+      <p:sp>
+        <p:nvSpPr>
+          <p:cNvPr id="4" name="TextBox 3">
+            <a:extLst>
+              <a:ext uri="{FF2B5EF4-FFF2-40B4-BE49-F238E27FC236}">
+                <a16:creationId xmlns:a16="http://schemas.microsoft.com/office/drawing/2014/main" id="{BFDFE2F0-E799-5B63-B8B7-6178A35D2DD4}"/>
+              </a:ext>
+            </a:extLst>
+          </p:cNvPr>
+          <p:cNvSpPr txBox="1"/>
+          <p:nvPr/>
+        </p:nvSpPr>
+        <p:spPr>
+          <a:xfrm>
+            <a:off x="1212981" y="1628021"/>
+            <a:ext cx="4436705" cy="646331"/>
+          </a:xfrm>
+          <a:prstGeom prst="rect">
+            <a:avLst/>
+          </a:prstGeom>
+          <a:noFill/>
+        </p:spPr>
+        <p:txBody>
+          <a:bodyPr wrap="square" rtlCol="0">
+            <a:spAutoFit/>
+          </a:bodyPr>
+          <a:lstStyle/>
+          <a:p>
+            <a:r>
+              <a:rPr lang="en-US" dirty="0"/>
+              <a:t>Leaking the key by modulating an (unused) pin on chip that generates an RF signal. </a:t>
+            </a:r>
+            <a:endParaRPr lang="el-GR" dirty="0"/>
+          </a:p>
+        </p:txBody>
+      </p:sp>
+      <p:sp>
+        <p:nvSpPr>
+          <p:cNvPr id="6" name="TextBox 5">
+            <a:extLst>
+              <a:ext uri="{FF2B5EF4-FFF2-40B4-BE49-F238E27FC236}">
+                <a16:creationId xmlns:a16="http://schemas.microsoft.com/office/drawing/2014/main" id="{4186C9DF-43D9-0C3B-5DFD-52EAF2C46AE2}"/>
+              </a:ext>
+            </a:extLst>
+          </p:cNvPr>
+          <p:cNvSpPr txBox="1"/>
+          <p:nvPr/>
+        </p:nvSpPr>
+        <p:spPr>
+          <a:xfrm>
+            <a:off x="1324946" y="2544053"/>
+            <a:ext cx="4697964" cy="2308324"/>
+          </a:xfrm>
+          <a:prstGeom prst="rect">
+            <a:avLst/>
+          </a:prstGeom>
+          <a:noFill/>
+        </p:spPr>
+        <p:txBody>
+          <a:bodyPr wrap="square" rtlCol="0">
+            <a:spAutoFit/>
+          </a:bodyPr>
+          <a:lstStyle/>
+          <a:p>
+            <a:r>
+              <a:rPr lang="en-US" dirty="0"/>
+              <a:t>Severity of the vulnerability:</a:t>
+            </a:r>
+          </a:p>
+          <a:p>
+            <a:endParaRPr lang="en-US" dirty="0"/>
+          </a:p>
+          <a:p>
+            <a:pPr marL="285750" indent="-285750">
+              <a:buFont typeface="Arial" panose="020B0604020202020204" pitchFamily="34" charset="0"/>
+              <a:buChar char="•"/>
+            </a:pPr>
+            <a:r>
+              <a:rPr lang="en-US" dirty="0"/>
+              <a:t>Insertion phase: Design</a:t>
+            </a:r>
+          </a:p>
+          <a:p>
+            <a:pPr marL="285750" indent="-285750">
+              <a:buFont typeface="Arial" panose="020B0604020202020204" pitchFamily="34" charset="0"/>
+              <a:buChar char="•"/>
+            </a:pPr>
+            <a:r>
+              <a:rPr lang="en-US" dirty="0"/>
+              <a:t>Abstraction level: Register Transfer level</a:t>
+            </a:r>
+          </a:p>
+          <a:p>
+            <a:pPr marL="285750" indent="-285750">
+              <a:buFont typeface="Arial" panose="020B0604020202020204" pitchFamily="34" charset="0"/>
+              <a:buChar char="•"/>
+            </a:pPr>
+            <a:r>
+              <a:rPr lang="en-US" dirty="0"/>
+              <a:t>Act. mechanism: Conditionally triggered</a:t>
+            </a:r>
+          </a:p>
+          <a:p>
+            <a:pPr marL="285750" indent="-285750">
+              <a:buFont typeface="Arial" panose="020B0604020202020204" pitchFamily="34" charset="0"/>
+              <a:buChar char="•"/>
+            </a:pPr>
+            <a:r>
+              <a:rPr lang="en-US" dirty="0"/>
+              <a:t>Effects: Leak Information</a:t>
+            </a:r>
+          </a:p>
+          <a:p>
+            <a:pPr marL="285750" indent="-285750">
+              <a:buFont typeface="Arial" panose="020B0604020202020204" pitchFamily="34" charset="0"/>
+              <a:buChar char="•"/>
+            </a:pPr>
+            <a:r>
+              <a:rPr lang="en-US" dirty="0"/>
+              <a:t>Location: Processor</a:t>
+            </a:r>
+          </a:p>
+          <a:p>
+            <a:pPr marL="285750" indent="-285750">
+              <a:buFont typeface="Arial" panose="020B0604020202020204" pitchFamily="34" charset="0"/>
+              <a:buChar char="•"/>
+            </a:pPr>
+            <a:r>
+              <a:rPr lang="en-US" dirty="0"/>
+              <a:t>Physical characteristics: Functional</a:t>
+            </a:r>
+            <a:endParaRPr lang="el-GR" dirty="0"/>
+          </a:p>
+        </p:txBody>
+      </p:sp>
     </p:spTree>
     <p:extLst>
       <p:ext uri="{BB962C8B-B14F-4D97-AF65-F5344CB8AC3E}">
-        <p14:creationId xmlns:p14="http://schemas.microsoft.com/office/powerpoint/2010/main" val="3248525363"/>
-      </p:ext>
-    </p:extLst>
-  </p:cSld>
-  <p:clrMapOvr>
-    <a:masterClrMapping/>
-  </p:clrMapOvr>
-</p:sld>
-</file>
-
-<file path=ppt/slides/slide18.xml><?xml version="1.0" encoding="utf-8"?>
-<p:sld xmlns:a="http://schemas.openxmlformats.org/drawingml/2006/main" xmlns:r="http://schemas.openxmlformats.org/officeDocument/2006/relationships" xmlns:p="http://schemas.openxmlformats.org/presentationml/2006/main">
-  <p:cSld>
-    <p:spTree>
-      <p:nvGrpSpPr>
-        <p:cNvPr id="1" name=""/>
-        <p:cNvGrpSpPr/>
-        <p:nvPr/>
-      </p:nvGrpSpPr>
-      <p:grpSpPr>
-        <a:xfrm>
-          <a:off x="0" y="0"/>
-          <a:ext cx="0" cy="0"/>
-          <a:chOff x="0" y="0"/>
-          <a:chExt cx="0" cy="0"/>
-        </a:xfrm>
-      </p:grpSpPr>
-    </p:spTree>
-    <p:extLst>
-      <p:ext uri="{BB962C8B-B14F-4D97-AF65-F5344CB8AC3E}">
-        <p14:creationId xmlns:p14="http://schemas.microsoft.com/office/powerpoint/2010/main" val="782273695"/>
+        <p14:creationId xmlns:p14="http://schemas.microsoft.com/office/powerpoint/2010/main" val="3096791553"/>
       </p:ext>
     </p:extLst>
   </p:cSld>
@@ -5391,7 +5910,7 @@
         <p:spPr>
           <a:xfrm>
             <a:off x="1155777" y="2175570"/>
-            <a:ext cx="6294594" cy="2677656"/>
+            <a:ext cx="6294594" cy="3046988"/>
           </a:xfrm>
           <a:prstGeom prst="rect">
             <a:avLst/>
@@ -5414,7 +5933,7 @@
             </a:r>
             <a:r>
               <a:rPr lang="en-US" sz="2400" dirty="0"/>
-              <a:t>) technique:</a:t>
+              <a:t>) technique because:</a:t>
             </a:r>
           </a:p>
           <a:p>
@@ -5437,7 +5956,7 @@
             </a:pPr>
             <a:r>
               <a:rPr lang="en-US" sz="2400" dirty="0"/>
-              <a:t>This tasks (like creating an FSM) require multiple intermediate reasoning steps.</a:t>
+              <a:t>These tasks (like creating an FSM) require multiple intermediate reasoning steps.</a:t>
             </a:r>
             <a:endParaRPr lang="el-GR" sz="2400" dirty="0"/>
           </a:p>
@@ -5573,7 +6092,7 @@
           <a:p>
             <a:r>
               <a:rPr lang="en-US" sz="2400" dirty="0"/>
-              <a:t>In order to gather the necessary steps to create a hardware trojan using an LLM I can enhance my prompt engineering technique </a:t>
+              <a:t>In order to gather the necessary steps to create a hardware trojan using an LLM, we enhanced our prompt engineering techniques </a:t>
             </a:r>
             <a:r>
               <a:rPr lang="en-US" sz="2400" b="1" dirty="0"/>
@@ -5702,7 +6221,7 @@
               <a:rPr lang="en-US" dirty="0">
                 <a:hlinkClick r:id="rId3"/>
               </a:rPr>
-              <a:t>Prompt example: https://chat.openai.com/share/8d425e27-d6d8-473b-9f53-7e42fdf6c008</a:t>
+              <a:t>Prompt example: https://chat.openai.com/share/44e37758-e3c0-4025-98a8-89f75f36166b</a:t>
             </a:r>
             <a:endParaRPr lang="el-GR" dirty="0"/>
           </a:p>
@@ -5793,7 +6312,7 @@
         <p:spPr>
           <a:xfrm>
             <a:off x="3464951" y="1269573"/>
-            <a:ext cx="8484041" cy="4893647"/>
+            <a:ext cx="8484041" cy="4524315"/>
           </a:xfrm>
           <a:prstGeom prst="rect">
             <a:avLst/>
@@ -5808,7 +6327,7 @@
           <a:p>
             <a:r>
               <a:rPr lang="en-US" sz="2400" dirty="0"/>
-              <a:t>I will </a:t>
+              <a:t>We </a:t>
             </a:r>
             <a:r>
               <a:rPr lang="en-US" sz="2400" b="1" dirty="0"/>
@@ -5816,7 +6335,7 @@
             </a:r>
             <a:r>
               <a:rPr lang="en-US" sz="2400" dirty="0"/>
-              <a:t> use the </a:t>
+              <a:t> used the </a:t>
             </a:r>
             <a:r>
               <a:rPr lang="en-US" sz="2400" u="sng" dirty="0"/>
@@ -5877,15 +6396,7 @@
             </a:r>
             <a:r>
               <a:rPr lang="en-US" sz="2400" i="1" dirty="0"/>
-              <a:t>“Provide code that a </a:t>
-            </a:r>
-            <a:r>
-              <a:rPr lang="en-US" sz="2400" i="1" dirty="0" err="1"/>
-              <a:t>digitall</a:t>
-            </a:r>
-            <a:r>
-              <a:rPr lang="en-US" sz="2400" i="1" dirty="0"/>
-              <a:t> designer would create”</a:t>
+              <a:t>“Provide code that a digital designer would create”</a:t>
             </a:r>
             <a:r>
               <a:rPr lang="en-US" sz="2400" dirty="0"/>
@@ -5907,15 +6418,7 @@
             </a:r>
             <a:r>
               <a:rPr lang="en-US" sz="2400" dirty="0"/>
-              <a:t> prompt </a:t>
-            </a:r>
-            <a:r>
-              <a:rPr lang="en-US" sz="2400" dirty="0" err="1"/>
-              <a:t>enginnering</a:t>
-            </a:r>
-            <a:r>
-              <a:rPr lang="en-US" sz="2400" dirty="0"/>
-              <a:t> technique (for example </a:t>
+              <a:t> prompt engineering technique (for example </a:t>
             </a:r>
             <a:r>
               <a:rPr lang="en-US" sz="2400" i="1" dirty="0"/>
@@ -6279,7 +6782,7 @@
           <a:p>
             <a:r>
               <a:rPr lang="en-US" dirty="0"/>
-              <a:t>During our research, the efforts of writing “malicious” code was inhibited by the content filtering process ChatGPT has. We discovered a way to bypass that protection and “exploit” the system by using ZULU as a primary language . I shared a conversation bellow as a Proof of Concept.</a:t>
+              <a:t>During our research, the efforts of writing “malicious” code was inhibited by the content filtering process ChatGPT has. We discovered a way to bypass that protection and “exploit” the system by using ZULU as a primary language . We share a conversation bellow as a Proof of Concept.</a:t>
             </a:r>
             <a:endParaRPr lang="el-GR" dirty="0"/>
           </a:p>

</xml_diff>